<commit_message>
standardized to git and GitHub
</commit_message>
<xml_diff>
--- a/case-studies/aarendt.pptx
+++ b/case-studies/aarendt.pptx
@@ -243,7 +243,7 @@
           <a:p>
             <a:fld id="{FA1A3021-8DBA-4414-A2F8-961D27BACBE5}" type="datetimeFigureOut">
               <a:rPr lang="en-US" smtClean="0"/>
-              <a:t>4/26/2016</a:t>
+              <a:t>6/30/16</a:t>
             </a:fld>
             <a:endParaRPr lang="en-US"/>
           </a:p>
@@ -413,7 +413,7 @@
           <a:p>
             <a:fld id="{FA1A3021-8DBA-4414-A2F8-961D27BACBE5}" type="datetimeFigureOut">
               <a:rPr lang="en-US" smtClean="0"/>
-              <a:t>4/26/2016</a:t>
+              <a:t>6/30/16</a:t>
             </a:fld>
             <a:endParaRPr lang="en-US"/>
           </a:p>
@@ -593,7 +593,7 @@
           <a:p>
             <a:fld id="{FA1A3021-8DBA-4414-A2F8-961D27BACBE5}" type="datetimeFigureOut">
               <a:rPr lang="en-US" smtClean="0"/>
-              <a:t>4/26/2016</a:t>
+              <a:t>6/30/16</a:t>
             </a:fld>
             <a:endParaRPr lang="en-US"/>
           </a:p>
@@ -763,7 +763,7 @@
           <a:p>
             <a:fld id="{FA1A3021-8DBA-4414-A2F8-961D27BACBE5}" type="datetimeFigureOut">
               <a:rPr lang="en-US" smtClean="0"/>
-              <a:t>4/26/2016</a:t>
+              <a:t>6/30/16</a:t>
             </a:fld>
             <a:endParaRPr lang="en-US"/>
           </a:p>
@@ -1007,7 +1007,7 @@
           <a:p>
             <a:fld id="{FA1A3021-8DBA-4414-A2F8-961D27BACBE5}" type="datetimeFigureOut">
               <a:rPr lang="en-US" smtClean="0"/>
-              <a:t>4/26/2016</a:t>
+              <a:t>6/30/16</a:t>
             </a:fld>
             <a:endParaRPr lang="en-US"/>
           </a:p>
@@ -1239,7 +1239,7 @@
           <a:p>
             <a:fld id="{FA1A3021-8DBA-4414-A2F8-961D27BACBE5}" type="datetimeFigureOut">
               <a:rPr lang="en-US" smtClean="0"/>
-              <a:t>4/26/2016</a:t>
+              <a:t>6/30/16</a:t>
             </a:fld>
             <a:endParaRPr lang="en-US"/>
           </a:p>
@@ -1606,7 +1606,7 @@
           <a:p>
             <a:fld id="{FA1A3021-8DBA-4414-A2F8-961D27BACBE5}" type="datetimeFigureOut">
               <a:rPr lang="en-US" smtClean="0"/>
-              <a:t>4/26/2016</a:t>
+              <a:t>6/30/16</a:t>
             </a:fld>
             <a:endParaRPr lang="en-US"/>
           </a:p>
@@ -1724,7 +1724,7 @@
           <a:p>
             <a:fld id="{FA1A3021-8DBA-4414-A2F8-961D27BACBE5}" type="datetimeFigureOut">
               <a:rPr lang="en-US" smtClean="0"/>
-              <a:t>4/26/2016</a:t>
+              <a:t>6/30/16</a:t>
             </a:fld>
             <a:endParaRPr lang="en-US"/>
           </a:p>
@@ -1819,7 +1819,7 @@
           <a:p>
             <a:fld id="{FA1A3021-8DBA-4414-A2F8-961D27BACBE5}" type="datetimeFigureOut">
               <a:rPr lang="en-US" smtClean="0"/>
-              <a:t>4/26/2016</a:t>
+              <a:t>6/30/16</a:t>
             </a:fld>
             <a:endParaRPr lang="en-US"/>
           </a:p>
@@ -2096,7 +2096,7 @@
           <a:p>
             <a:fld id="{FA1A3021-8DBA-4414-A2F8-961D27BACBE5}" type="datetimeFigureOut">
               <a:rPr lang="en-US" smtClean="0"/>
-              <a:t>4/26/2016</a:t>
+              <a:t>6/30/16</a:t>
             </a:fld>
             <a:endParaRPr lang="en-US"/>
           </a:p>
@@ -2353,7 +2353,7 @@
           <a:p>
             <a:fld id="{FA1A3021-8DBA-4414-A2F8-961D27BACBE5}" type="datetimeFigureOut">
               <a:rPr lang="en-US" smtClean="0"/>
-              <a:t>4/26/2016</a:t>
+              <a:t>6/30/16</a:t>
             </a:fld>
             <a:endParaRPr lang="en-US"/>
           </a:p>
@@ -2566,7 +2566,7 @@
           <a:p>
             <a:fld id="{FA1A3021-8DBA-4414-A2F8-961D27BACBE5}" type="datetimeFigureOut">
               <a:rPr lang="en-US" smtClean="0"/>
-              <a:t>4/26/2016</a:t>
+              <a:t>6/30/16</a:t>
             </a:fld>
             <a:endParaRPr lang="en-US"/>
           </a:p>
@@ -5641,7 +5641,14 @@
                 <a:latin typeface="Helvetica" panose="020B0604020202020204" pitchFamily="34" charset="0"/>
                 <a:cs typeface="Helvetica" panose="020B0604020202020204" pitchFamily="34" charset="0"/>
               </a:rPr>
-              <a:t>github</a:t>
+              <a:t>G</a:t>
+            </a:r>
+            <a:r>
+              <a:rPr lang="en-US" sz="900" dirty="0" err="1" smtClean="0">
+                <a:latin typeface="Helvetica" panose="020B0604020202020204" pitchFamily="34" charset="0"/>
+                <a:cs typeface="Helvetica" panose="020B0604020202020204" pitchFamily="34" charset="0"/>
+              </a:rPr>
+              <a:t>itHub</a:t>
             </a:r>
             <a:endParaRPr lang="en-US" sz="900" dirty="0">
               <a:latin typeface="Helvetica" panose="020B0604020202020204" pitchFamily="34" charset="0"/>

</xml_diff>

<commit_message>
Update aarendt figure, increase font sizes
</commit_message>
<xml_diff>
--- a/case-studies/aarendt.pptx
+++ b/case-studies/aarendt.pptx
@@ -243,7 +243,7 @@
           <a:p>
             <a:fld id="{FA1A3021-8DBA-4414-A2F8-961D27BACBE5}" type="datetimeFigureOut">
               <a:rPr lang="en-US" smtClean="0"/>
-              <a:t>6/30/16</a:t>
+              <a:t>1/17/17</a:t>
             </a:fld>
             <a:endParaRPr lang="en-US"/>
           </a:p>
@@ -413,7 +413,7 @@
           <a:p>
             <a:fld id="{FA1A3021-8DBA-4414-A2F8-961D27BACBE5}" type="datetimeFigureOut">
               <a:rPr lang="en-US" smtClean="0"/>
-              <a:t>6/30/16</a:t>
+              <a:t>1/17/17</a:t>
             </a:fld>
             <a:endParaRPr lang="en-US"/>
           </a:p>
@@ -593,7 +593,7 @@
           <a:p>
             <a:fld id="{FA1A3021-8DBA-4414-A2F8-961D27BACBE5}" type="datetimeFigureOut">
               <a:rPr lang="en-US" smtClean="0"/>
-              <a:t>6/30/16</a:t>
+              <a:t>1/17/17</a:t>
             </a:fld>
             <a:endParaRPr lang="en-US"/>
           </a:p>
@@ -763,7 +763,7 @@
           <a:p>
             <a:fld id="{FA1A3021-8DBA-4414-A2F8-961D27BACBE5}" type="datetimeFigureOut">
               <a:rPr lang="en-US" smtClean="0"/>
-              <a:t>6/30/16</a:t>
+              <a:t>1/17/17</a:t>
             </a:fld>
             <a:endParaRPr lang="en-US"/>
           </a:p>
@@ -1007,7 +1007,7 @@
           <a:p>
             <a:fld id="{FA1A3021-8DBA-4414-A2F8-961D27BACBE5}" type="datetimeFigureOut">
               <a:rPr lang="en-US" smtClean="0"/>
-              <a:t>6/30/16</a:t>
+              <a:t>1/17/17</a:t>
             </a:fld>
             <a:endParaRPr lang="en-US"/>
           </a:p>
@@ -1239,7 +1239,7 @@
           <a:p>
             <a:fld id="{FA1A3021-8DBA-4414-A2F8-961D27BACBE5}" type="datetimeFigureOut">
               <a:rPr lang="en-US" smtClean="0"/>
-              <a:t>6/30/16</a:t>
+              <a:t>1/17/17</a:t>
             </a:fld>
             <a:endParaRPr lang="en-US"/>
           </a:p>
@@ -1606,7 +1606,7 @@
           <a:p>
             <a:fld id="{FA1A3021-8DBA-4414-A2F8-961D27BACBE5}" type="datetimeFigureOut">
               <a:rPr lang="en-US" smtClean="0"/>
-              <a:t>6/30/16</a:t>
+              <a:t>1/17/17</a:t>
             </a:fld>
             <a:endParaRPr lang="en-US"/>
           </a:p>
@@ -1724,7 +1724,7 @@
           <a:p>
             <a:fld id="{FA1A3021-8DBA-4414-A2F8-961D27BACBE5}" type="datetimeFigureOut">
               <a:rPr lang="en-US" smtClean="0"/>
-              <a:t>6/30/16</a:t>
+              <a:t>1/17/17</a:t>
             </a:fld>
             <a:endParaRPr lang="en-US"/>
           </a:p>
@@ -1819,7 +1819,7 @@
           <a:p>
             <a:fld id="{FA1A3021-8DBA-4414-A2F8-961D27BACBE5}" type="datetimeFigureOut">
               <a:rPr lang="en-US" smtClean="0"/>
-              <a:t>6/30/16</a:t>
+              <a:t>1/17/17</a:t>
             </a:fld>
             <a:endParaRPr lang="en-US"/>
           </a:p>
@@ -2096,7 +2096,7 @@
           <a:p>
             <a:fld id="{FA1A3021-8DBA-4414-A2F8-961D27BACBE5}" type="datetimeFigureOut">
               <a:rPr lang="en-US" smtClean="0"/>
-              <a:t>6/30/16</a:t>
+              <a:t>1/17/17</a:t>
             </a:fld>
             <a:endParaRPr lang="en-US"/>
           </a:p>
@@ -2353,7 +2353,7 @@
           <a:p>
             <a:fld id="{FA1A3021-8DBA-4414-A2F8-961D27BACBE5}" type="datetimeFigureOut">
               <a:rPr lang="en-US" smtClean="0"/>
-              <a:t>6/30/16</a:t>
+              <a:t>1/17/17</a:t>
             </a:fld>
             <a:endParaRPr lang="en-US"/>
           </a:p>
@@ -2566,7 +2566,7 @@
           <a:p>
             <a:fld id="{FA1A3021-8DBA-4414-A2F8-961D27BACBE5}" type="datetimeFigureOut">
               <a:rPr lang="en-US" smtClean="0"/>
-              <a:t>6/30/16</a:t>
+              <a:t>1/17/17</a:t>
             </a:fld>
             <a:endParaRPr lang="en-US"/>
           </a:p>
@@ -3087,8 +3087,8 @@
         </p:nvSpPr>
         <p:spPr>
           <a:xfrm>
-            <a:off x="287100" y="647451"/>
-            <a:ext cx="1192527" cy="326572"/>
+            <a:off x="228142" y="503095"/>
+            <a:ext cx="1251486" cy="450793"/>
           </a:xfrm>
           <a:prstGeom prst="roundRect">
             <a:avLst/>
@@ -3124,7 +3124,7 @@
           <a:p>
             <a:pPr algn="ctr"/>
             <a:r>
-              <a:rPr lang="en-US" sz="1100" dirty="0" smtClean="0">
+              <a:rPr lang="en-US" sz="1200" dirty="0" smtClean="0">
                 <a:solidFill>
                   <a:schemeClr val="tx1"/>
                 </a:solidFill>
@@ -3133,7 +3133,7 @@
               </a:rPr>
               <a:t>LiDAR/GPS measurements</a:t>
             </a:r>
-            <a:endParaRPr lang="en-US" sz="1100" dirty="0">
+            <a:endParaRPr lang="en-US" sz="1200" dirty="0">
               <a:solidFill>
                 <a:schemeClr val="tx1"/>
               </a:solidFill>
@@ -3151,8 +3151,8 @@
         </p:nvSpPr>
         <p:spPr>
           <a:xfrm>
-            <a:off x="287101" y="1829497"/>
-            <a:ext cx="1192527" cy="326572"/>
+            <a:off x="228143" y="1888193"/>
+            <a:ext cx="1251486" cy="267876"/>
           </a:xfrm>
           <a:prstGeom prst="roundRect">
             <a:avLst/>
@@ -3188,7 +3188,7 @@
           <a:p>
             <a:pPr algn="ctr"/>
             <a:r>
-              <a:rPr lang="en-US" sz="1100" dirty="0">
+              <a:rPr lang="en-US" sz="1200" dirty="0">
                 <a:solidFill>
                   <a:schemeClr val="tx1"/>
                 </a:solidFill>
@@ -3198,7 +3198,7 @@
               <a:t>s</a:t>
             </a:r>
             <a:r>
-              <a:rPr lang="en-US" sz="1100" dirty="0" smtClean="0">
+              <a:rPr lang="en-US" sz="1200" dirty="0" smtClean="0">
                 <a:solidFill>
                   <a:schemeClr val="tx1"/>
                 </a:solidFill>
@@ -3207,7 +3207,7 @@
               </a:rPr>
               <a:t>atellite data</a:t>
             </a:r>
-            <a:endParaRPr lang="en-US" sz="1100" dirty="0">
+            <a:endParaRPr lang="en-US" sz="1200" dirty="0">
               <a:solidFill>
                 <a:schemeClr val="tx1"/>
               </a:solidFill>
@@ -3225,8 +3225,8 @@
         </p:nvSpPr>
         <p:spPr>
           <a:xfrm>
-            <a:off x="287100" y="4058715"/>
-            <a:ext cx="843924" cy="326572"/>
+            <a:off x="245376" y="4117410"/>
+            <a:ext cx="885648" cy="414053"/>
           </a:xfrm>
           <a:prstGeom prst="roundRect">
             <a:avLst/>
@@ -3262,7 +3262,7 @@
           <a:p>
             <a:pPr algn="ctr"/>
             <a:r>
-              <a:rPr lang="en-US" sz="1100" dirty="0" smtClean="0">
+              <a:rPr lang="en-US" sz="1200" dirty="0" smtClean="0">
                 <a:solidFill>
                   <a:schemeClr val="tx1"/>
                 </a:solidFill>
@@ -3271,7 +3271,7 @@
               </a:rPr>
               <a:t>elevation maps</a:t>
             </a:r>
-            <a:endParaRPr lang="en-US" sz="1100" dirty="0">
+            <a:endParaRPr lang="en-US" sz="1200" dirty="0">
               <a:solidFill>
                 <a:schemeClr val="tx1"/>
               </a:solidFill>
@@ -3336,7 +3336,7 @@
         <p:spPr>
           <a:xfrm>
             <a:off x="2049890" y="372291"/>
-            <a:ext cx="2619628" cy="261610"/>
+            <a:ext cx="2829301" cy="276999"/>
           </a:xfrm>
           <a:prstGeom prst="rect">
             <a:avLst/>
@@ -3350,13 +3350,13 @@
           <a:lstStyle/>
           <a:p>
             <a:r>
-              <a:rPr lang="en-US" sz="1100" dirty="0" smtClean="0">
+              <a:rPr lang="en-US" sz="1200" dirty="0" smtClean="0">
                 <a:latin typeface="Helvetica" panose="020B0604020202020204" pitchFamily="34" charset="0"/>
                 <a:cs typeface="Helvetica" panose="020B0604020202020204" pitchFamily="34" charset="0"/>
               </a:rPr>
               <a:t>cloud virtual machine (Microsoft Azure)</a:t>
             </a:r>
-            <a:endParaRPr lang="en-US" sz="1100" dirty="0">
+            <a:endParaRPr lang="en-US" sz="1200" dirty="0">
               <a:latin typeface="Helvetica" panose="020B0604020202020204" pitchFamily="34" charset="0"/>
               <a:cs typeface="Helvetica" panose="020B0604020202020204" pitchFamily="34" charset="0"/>
             </a:endParaRPr>
@@ -3417,8 +3417,8 @@
         </p:nvSpPr>
         <p:spPr>
           <a:xfrm>
-            <a:off x="287100" y="2579556"/>
-            <a:ext cx="1192527" cy="326572"/>
+            <a:off x="213402" y="2564604"/>
+            <a:ext cx="1251486" cy="409658"/>
           </a:xfrm>
           <a:prstGeom prst="roundRect">
             <a:avLst/>
@@ -3454,7 +3454,7 @@
           <a:p>
             <a:pPr algn="ctr"/>
             <a:r>
-              <a:rPr lang="en-US" sz="1100" dirty="0" smtClean="0">
+              <a:rPr lang="en-US" sz="1200" dirty="0" smtClean="0">
                 <a:solidFill>
                   <a:schemeClr val="tx1"/>
                 </a:solidFill>
@@ -3463,7 +3463,7 @@
               </a:rPr>
               <a:t>regional glacier delineation</a:t>
             </a:r>
-            <a:endParaRPr lang="en-US" sz="1100" dirty="0">
+            <a:endParaRPr lang="en-US" sz="1200" dirty="0">
               <a:solidFill>
                 <a:schemeClr val="tx1"/>
               </a:solidFill>
@@ -3484,8 +3484,8 @@
         </p:nvCxnSpPr>
         <p:spPr>
           <a:xfrm flipH="1">
-            <a:off x="883364" y="2156069"/>
-            <a:ext cx="1" cy="423487"/>
+            <a:off x="839145" y="2156069"/>
+            <a:ext cx="14741" cy="408535"/>
           </a:xfrm>
           <a:prstGeom prst="straightConnector1">
             <a:avLst/>
@@ -3520,8 +3520,8 @@
         </p:nvSpPr>
         <p:spPr>
           <a:xfrm>
-            <a:off x="1050265" y="3202043"/>
-            <a:ext cx="843924" cy="560757"/>
+            <a:off x="990240" y="3309794"/>
+            <a:ext cx="879945" cy="560757"/>
           </a:xfrm>
           <a:prstGeom prst="roundRect">
             <a:avLst/>
@@ -3557,7 +3557,7 @@
           <a:p>
             <a:pPr algn="ctr"/>
             <a:r>
-              <a:rPr lang="en-US" sz="1100" dirty="0" smtClean="0">
+              <a:rPr lang="en-US" sz="1200" dirty="0" smtClean="0">
                 <a:solidFill>
                   <a:schemeClr val="tx1"/>
                 </a:solidFill>
@@ -3566,7 +3566,7 @@
               </a:rPr>
               <a:t>individual glacier inventory</a:t>
             </a:r>
-            <a:endParaRPr lang="en-US" sz="1100" dirty="0">
+            <a:endParaRPr lang="en-US" sz="1200" dirty="0">
               <a:solidFill>
                 <a:schemeClr val="tx1"/>
               </a:solidFill>
@@ -3585,7 +3585,7 @@
         <p:spPr>
           <a:xfrm>
             <a:off x="2200419" y="2201479"/>
-            <a:ext cx="2919389" cy="261610"/>
+            <a:ext cx="3163045" cy="276999"/>
           </a:xfrm>
           <a:prstGeom prst="rect">
             <a:avLst/>
@@ -3599,27 +3599,27 @@
           <a:lstStyle/>
           <a:p>
             <a:r>
-              <a:rPr lang="en-US" sz="1100" dirty="0" smtClean="0">
+              <a:rPr lang="en-US" sz="1200" dirty="0" smtClean="0">
                 <a:latin typeface="Helvetica" panose="020B0604020202020204" pitchFamily="34" charset="0"/>
                 <a:cs typeface="Helvetica" panose="020B0604020202020204" pitchFamily="34" charset="0"/>
               </a:rPr>
               <a:t>Relational Database (PostgreSQL/</a:t>
             </a:r>
             <a:r>
-              <a:rPr lang="en-US" sz="1100" dirty="0" err="1" smtClean="0">
+              <a:rPr lang="en-US" sz="1200" dirty="0" err="1" smtClean="0">
                 <a:latin typeface="Helvetica" panose="020B0604020202020204" pitchFamily="34" charset="0"/>
                 <a:cs typeface="Helvetica" panose="020B0604020202020204" pitchFamily="34" charset="0"/>
               </a:rPr>
               <a:t>PostGIS</a:t>
             </a:r>
             <a:r>
-              <a:rPr lang="en-US" sz="1100" dirty="0" smtClean="0">
+              <a:rPr lang="en-US" sz="1200" dirty="0" smtClean="0">
                 <a:latin typeface="Helvetica" panose="020B0604020202020204" pitchFamily="34" charset="0"/>
                 <a:cs typeface="Helvetica" panose="020B0604020202020204" pitchFamily="34" charset="0"/>
               </a:rPr>
               <a:t>)</a:t>
             </a:r>
-            <a:endParaRPr lang="en-US" sz="1100" dirty="0">
+            <a:endParaRPr lang="en-US" sz="1200" dirty="0">
               <a:latin typeface="Helvetica" panose="020B0604020202020204" pitchFamily="34" charset="0"/>
               <a:cs typeface="Helvetica" panose="020B0604020202020204" pitchFamily="34" charset="0"/>
             </a:endParaRPr>
@@ -3634,8 +3634,8 @@
         </p:nvSpPr>
         <p:spPr>
           <a:xfrm>
-            <a:off x="2239175" y="794369"/>
-            <a:ext cx="1296956" cy="494258"/>
+            <a:off x="2239175" y="663778"/>
+            <a:ext cx="1296956" cy="624849"/>
           </a:xfrm>
           <a:prstGeom prst="roundRect">
             <a:avLst/>
@@ -3671,7 +3671,7 @@
           <a:p>
             <a:pPr algn="ctr"/>
             <a:r>
-              <a:rPr lang="en-US" sz="1100" dirty="0" smtClean="0">
+              <a:rPr lang="en-US" sz="1200" dirty="0" smtClean="0">
                 <a:solidFill>
                   <a:schemeClr val="tx1"/>
                 </a:solidFill>
@@ -3684,7 +3684,7 @@
           <a:p>
             <a:pPr algn="ctr"/>
             <a:r>
-              <a:rPr lang="en-US" sz="1100" dirty="0" smtClean="0">
+              <a:rPr lang="en-US" sz="1200" dirty="0" smtClean="0">
                 <a:solidFill>
                   <a:schemeClr val="tx1"/>
                 </a:solidFill>
@@ -3693,7 +3693,7 @@
               </a:rPr>
               <a:t>visualization</a:t>
             </a:r>
-            <a:endParaRPr lang="en-US" sz="1100" dirty="0">
+            <a:endParaRPr lang="en-US" sz="1200" dirty="0">
               <a:solidFill>
                 <a:schemeClr val="tx1"/>
               </a:solidFill>
@@ -3748,7 +3748,7 @@
           <a:p>
             <a:pPr algn="ctr"/>
             <a:r>
-              <a:rPr lang="en-US" sz="1100" dirty="0" smtClean="0">
+              <a:rPr lang="en-US" sz="1200" dirty="0" smtClean="0">
                 <a:solidFill>
                   <a:schemeClr val="tx1"/>
                 </a:solidFill>
@@ -3758,7 +3758,7 @@
               <a:t>extrapolation, </a:t>
             </a:r>
             <a:r>
-              <a:rPr lang="en-US" sz="1100" dirty="0">
+              <a:rPr lang="en-US" sz="1200" dirty="0">
                 <a:solidFill>
                   <a:schemeClr val="tx1"/>
                 </a:solidFill>
@@ -3771,7 +3771,7 @@
           <a:p>
             <a:pPr algn="ctr"/>
             <a:r>
-              <a:rPr lang="en-US" sz="1100" dirty="0">
+              <a:rPr lang="en-US" sz="1200" dirty="0">
                 <a:solidFill>
                   <a:schemeClr val="tx1"/>
                 </a:solidFill>
@@ -3781,7 +3781,7 @@
               <a:t>sea level </a:t>
             </a:r>
             <a:r>
-              <a:rPr lang="en-US" sz="1100" dirty="0" smtClean="0">
+              <a:rPr lang="en-US" sz="1200" dirty="0" smtClean="0">
                 <a:solidFill>
                   <a:schemeClr val="tx1"/>
                 </a:solidFill>
@@ -3790,7 +3790,7 @@
               </a:rPr>
               <a:t>estimates</a:t>
             </a:r>
-            <a:endParaRPr lang="en-US" sz="1100" dirty="0">
+            <a:endParaRPr lang="en-US" sz="1200" dirty="0">
               <a:solidFill>
                 <a:schemeClr val="tx1"/>
               </a:solidFill>
@@ -3811,8 +3811,8 @@
         </p:nvCxnSpPr>
         <p:spPr>
           <a:xfrm rot="16200000" flipH="1">
-            <a:off x="678667" y="3110824"/>
-            <a:ext cx="576294" cy="166901"/>
+            <a:off x="606737" y="3206669"/>
+            <a:ext cx="615911" cy="151095"/>
           </a:xfrm>
           <a:prstGeom prst="curvedConnector2">
             <a:avLst/>
@@ -3847,8 +3847,8 @@
         </p:nvSpPr>
         <p:spPr>
           <a:xfrm>
-            <a:off x="228141" y="3151580"/>
-            <a:ext cx="808715" cy="369332"/>
+            <a:off x="55475" y="3289025"/>
+            <a:ext cx="808715" cy="415498"/>
           </a:xfrm>
           <a:prstGeom prst="rect">
             <a:avLst/>
@@ -3863,20 +3863,20 @@
           <a:p>
             <a:pPr algn="ctr"/>
             <a:r>
-              <a:rPr lang="en-US" sz="900" dirty="0" err="1" smtClean="0">
+              <a:rPr lang="en-US" sz="1050" dirty="0" err="1" smtClean="0">
                 <a:latin typeface="Helvetica" panose="020B0604020202020204" pitchFamily="34" charset="0"/>
                 <a:cs typeface="Helvetica" panose="020B0604020202020204" pitchFamily="34" charset="0"/>
               </a:rPr>
               <a:t>ArcPy</a:t>
             </a:r>
             <a:r>
-              <a:rPr lang="en-US" sz="900" dirty="0" smtClean="0">
+              <a:rPr lang="en-US" sz="1050" dirty="0" smtClean="0">
                 <a:latin typeface="Helvetica" panose="020B0604020202020204" pitchFamily="34" charset="0"/>
                 <a:cs typeface="Helvetica" panose="020B0604020202020204" pitchFamily="34" charset="0"/>
               </a:rPr>
               <a:t> (Python)</a:t>
             </a:r>
-            <a:endParaRPr lang="en-US" sz="900" dirty="0">
+            <a:endParaRPr lang="en-US" sz="1050" dirty="0">
               <a:latin typeface="Helvetica" panose="020B0604020202020204" pitchFamily="34" charset="0"/>
               <a:cs typeface="Helvetica" panose="020B0604020202020204" pitchFamily="34" charset="0"/>
             </a:endParaRPr>
@@ -3894,8 +3894,8 @@
         </p:nvCxnSpPr>
         <p:spPr>
           <a:xfrm rot="5400000" flipH="1" flipV="1">
-            <a:off x="591517" y="3599968"/>
-            <a:ext cx="576293" cy="341203"/>
+            <a:off x="575602" y="3702772"/>
+            <a:ext cx="527237" cy="302040"/>
           </a:xfrm>
           <a:prstGeom prst="curvedConnector2">
             <a:avLst/>
@@ -3931,7 +3931,7 @@
         <p:spPr>
           <a:xfrm>
             <a:off x="186701" y="2252984"/>
-            <a:ext cx="808715" cy="230832"/>
+            <a:ext cx="808715" cy="253916"/>
           </a:xfrm>
           <a:prstGeom prst="rect">
             <a:avLst/>
@@ -3946,13 +3946,13 @@
           <a:p>
             <a:pPr algn="ctr"/>
             <a:r>
-              <a:rPr lang="en-US" sz="900" dirty="0" smtClean="0">
+              <a:rPr lang="en-US" sz="1050" dirty="0" smtClean="0">
                 <a:latin typeface="Helvetica" panose="020B0604020202020204" pitchFamily="34" charset="0"/>
                 <a:cs typeface="Helvetica" panose="020B0604020202020204" pitchFamily="34" charset="0"/>
               </a:rPr>
               <a:t>ArcGIS</a:t>
             </a:r>
-            <a:endParaRPr lang="en-US" sz="900" dirty="0">
+            <a:endParaRPr lang="en-US" sz="1050" dirty="0">
               <a:latin typeface="Helvetica" panose="020B0604020202020204" pitchFamily="34" charset="0"/>
               <a:cs typeface="Helvetica" panose="020B0604020202020204" pitchFamily="34" charset="0"/>
             </a:endParaRPr>
@@ -3967,8 +3967,8 @@
         </p:nvSpPr>
         <p:spPr>
           <a:xfrm>
-            <a:off x="287099" y="1304884"/>
-            <a:ext cx="1192527" cy="326572"/>
+            <a:off x="228141" y="1363579"/>
+            <a:ext cx="1251486" cy="427699"/>
           </a:xfrm>
           <a:prstGeom prst="roundRect">
             <a:avLst/>
@@ -4004,7 +4004,7 @@
           <a:p>
             <a:pPr algn="ctr"/>
             <a:r>
-              <a:rPr lang="en-US" sz="1100" dirty="0" smtClean="0">
+              <a:rPr lang="en-US" sz="1200" dirty="0" smtClean="0">
                 <a:solidFill>
                   <a:schemeClr val="tx1"/>
                 </a:solidFill>
@@ -4013,7 +4013,7 @@
               </a:rPr>
               <a:t>Alaska data repository</a:t>
             </a:r>
-            <a:endParaRPr lang="en-US" sz="1100" dirty="0">
+            <a:endParaRPr lang="en-US" sz="1200" dirty="0">
               <a:solidFill>
                 <a:schemeClr val="tx1"/>
               </a:solidFill>
@@ -4034,8 +4034,8 @@
         </p:nvCxnSpPr>
         <p:spPr>
           <a:xfrm flipH="1">
-            <a:off x="883363" y="974023"/>
-            <a:ext cx="1" cy="330861"/>
+            <a:off x="853884" y="953888"/>
+            <a:ext cx="1" cy="409691"/>
           </a:xfrm>
           <a:prstGeom prst="straightConnector1">
             <a:avLst/>
@@ -4071,7 +4071,7 @@
         <p:spPr>
           <a:xfrm>
             <a:off x="213038" y="1027017"/>
-            <a:ext cx="808715" cy="230832"/>
+            <a:ext cx="808715" cy="253916"/>
           </a:xfrm>
           <a:prstGeom prst="rect">
             <a:avLst/>
@@ -4086,13 +4086,13 @@
           <a:p>
             <a:pPr algn="ctr"/>
             <a:r>
-              <a:rPr lang="en-US" sz="900" dirty="0" err="1" smtClean="0">
+              <a:rPr lang="en-US" sz="1050" dirty="0" err="1" smtClean="0">
                 <a:latin typeface="Helvetica" panose="020B0604020202020204" pitchFamily="34" charset="0"/>
                 <a:cs typeface="Helvetica" panose="020B0604020202020204" pitchFamily="34" charset="0"/>
               </a:rPr>
               <a:t>Matlab</a:t>
             </a:r>
-            <a:endParaRPr lang="en-US" sz="900" dirty="0">
+            <a:endParaRPr lang="en-US" sz="1050" dirty="0">
               <a:latin typeface="Helvetica" panose="020B0604020202020204" pitchFamily="34" charset="0"/>
               <a:cs typeface="Helvetica" panose="020B0604020202020204" pitchFamily="34" charset="0"/>
             </a:endParaRPr>
@@ -4107,8 +4107,8 @@
         </p:nvSpPr>
         <p:spPr>
           <a:xfrm>
-            <a:off x="3709218" y="775439"/>
-            <a:ext cx="1698688" cy="985174"/>
+            <a:off x="3709218" y="663778"/>
+            <a:ext cx="1698688" cy="1205658"/>
           </a:xfrm>
           <a:prstGeom prst="roundRect">
             <a:avLst/>
@@ -4143,18 +4143,26 @@
           <a:lstStyle/>
           <a:p>
             <a:r>
-              <a:rPr lang="en-US" sz="1100" dirty="0" smtClean="0">
+              <a:rPr lang="en-US" sz="1200" dirty="0" smtClean="0">
                 <a:solidFill>
                   <a:schemeClr val="tx1"/>
                 </a:solidFill>
                 <a:latin typeface="Helvetica" panose="020B0604020202020204" pitchFamily="34" charset="0"/>
                 <a:cs typeface="Helvetica" panose="020B0604020202020204" pitchFamily="34" charset="0"/>
               </a:rPr>
-              <a:t>LiDAR data object</a:t>
-            </a:r>
-          </a:p>
-          <a:p>
-            <a:endParaRPr lang="en-US" sz="1100" dirty="0" smtClean="0">
+              <a:t>LiDAR data </a:t>
+            </a:r>
+            <a:r>
+              <a:rPr lang="en-US" sz="1200" dirty="0" smtClean="0">
+                <a:solidFill>
+                  <a:schemeClr val="tx1"/>
+                </a:solidFill>
+                <a:latin typeface="Helvetica" panose="020B0604020202020204" pitchFamily="34" charset="0"/>
+                <a:cs typeface="Helvetica" panose="020B0604020202020204" pitchFamily="34" charset="0"/>
+              </a:rPr>
+              <a:t>object</a:t>
+            </a:r>
+            <a:endParaRPr lang="en-US" sz="1200" dirty="0" smtClean="0">
               <a:solidFill>
                 <a:schemeClr val="tx1"/>
               </a:solidFill>
@@ -4164,7 +4172,7 @@
           </a:p>
           <a:p>
             <a:r>
-              <a:rPr lang="en-US" sz="900" i="1" dirty="0">
+              <a:rPr lang="en-US" sz="1000" i="1" dirty="0">
                 <a:solidFill>
                   <a:schemeClr val="tx1"/>
                 </a:solidFill>
@@ -4174,7 +4182,7 @@
               <a:t>-</a:t>
             </a:r>
             <a:r>
-              <a:rPr lang="en-US" sz="900" i="1" dirty="0" smtClean="0">
+              <a:rPr lang="en-US" sz="1000" i="1" dirty="0" smtClean="0">
                 <a:solidFill>
                   <a:schemeClr val="tx1"/>
                 </a:solidFill>
@@ -4184,7 +4192,7 @@
               <a:t>attributes-</a:t>
             </a:r>
             <a:r>
-              <a:rPr lang="en-US" sz="900" dirty="0" smtClean="0">
+              <a:rPr lang="en-US" sz="1000" dirty="0" smtClean="0">
                 <a:solidFill>
                   <a:schemeClr val="tx1"/>
                 </a:solidFill>
@@ -4196,7 +4204,7 @@
           </a:p>
           <a:p>
             <a:r>
-              <a:rPr lang="en-US" sz="900" i="1" dirty="0" smtClean="0">
+              <a:rPr lang="en-US" sz="1000" i="1" dirty="0" smtClean="0">
                 <a:solidFill>
                   <a:schemeClr val="tx1"/>
                 </a:solidFill>
@@ -4206,7 +4214,7 @@
               <a:t>-methods- </a:t>
             </a:r>
             <a:r>
-              <a:rPr lang="en-US" sz="900" dirty="0" smtClean="0">
+              <a:rPr lang="en-US" sz="1000" dirty="0" smtClean="0">
                 <a:solidFill>
                   <a:schemeClr val="tx1"/>
                 </a:solidFill>
@@ -4215,7 +4223,7 @@
               </a:rPr>
               <a:t>unit conversion, normalization, statistics</a:t>
             </a:r>
-            <a:endParaRPr lang="en-US" sz="900" i="1" dirty="0">
+            <a:endParaRPr lang="en-US" sz="1000" i="1" dirty="0">
               <a:solidFill>
                 <a:schemeClr val="tx1"/>
               </a:solidFill>
@@ -4233,8 +4241,8 @@
         </p:nvSpPr>
         <p:spPr>
           <a:xfrm>
-            <a:off x="1243153" y="2961053"/>
-            <a:ext cx="870751" cy="230832"/>
+            <a:off x="1168626" y="3011533"/>
+            <a:ext cx="984565" cy="253916"/>
           </a:xfrm>
           <a:prstGeom prst="rect">
             <a:avLst/>
@@ -4248,13 +4256,13 @@
           <a:lstStyle/>
           <a:p>
             <a:r>
-              <a:rPr lang="en-US" sz="900" dirty="0" smtClean="0">
+              <a:rPr lang="en-US" sz="1050" dirty="0" smtClean="0">
                 <a:latin typeface="Helvetica" panose="020B0604020202020204" pitchFamily="34" charset="0"/>
                 <a:cs typeface="Helvetica" panose="020B0604020202020204" pitchFamily="34" charset="0"/>
               </a:rPr>
               <a:t>SQL / Python</a:t>
             </a:r>
-            <a:endParaRPr lang="en-US" sz="900" dirty="0">
+            <a:endParaRPr lang="en-US" sz="1050" dirty="0">
               <a:latin typeface="Helvetica" panose="020B0604020202020204" pitchFamily="34" charset="0"/>
               <a:cs typeface="Helvetica" panose="020B0604020202020204" pitchFamily="34" charset="0"/>
             </a:endParaRPr>
@@ -4272,8 +4280,8 @@
         </p:nvCxnSpPr>
         <p:spPr>
           <a:xfrm flipV="1">
-            <a:off x="1479626" y="1041498"/>
-            <a:ext cx="759549" cy="426672"/>
+            <a:off x="1479627" y="976203"/>
+            <a:ext cx="759548" cy="601226"/>
           </a:xfrm>
           <a:prstGeom prst="straightConnector1">
             <a:avLst/>
@@ -4308,8 +4316,8 @@
         </p:nvSpPr>
         <p:spPr>
           <a:xfrm rot="19921544">
-            <a:off x="1566770" y="1057776"/>
-            <a:ext cx="402674" cy="230832"/>
+            <a:off x="1549137" y="1046234"/>
+            <a:ext cx="437940" cy="253916"/>
           </a:xfrm>
           <a:prstGeom prst="rect">
             <a:avLst/>
@@ -4323,13 +4331,13 @@
           <a:lstStyle/>
           <a:p>
             <a:r>
-              <a:rPr lang="en-US" sz="900" dirty="0" smtClean="0">
+              <a:rPr lang="en-US" sz="1050" dirty="0" smtClean="0">
                 <a:latin typeface="Helvetica" panose="020B0604020202020204" pitchFamily="34" charset="0"/>
                 <a:cs typeface="Helvetica" panose="020B0604020202020204" pitchFamily="34" charset="0"/>
               </a:rPr>
               <a:t>FTP</a:t>
             </a:r>
-            <a:endParaRPr lang="en-US" sz="900" dirty="0">
+            <a:endParaRPr lang="en-US" sz="1050" dirty="0">
               <a:latin typeface="Helvetica" panose="020B0604020202020204" pitchFamily="34" charset="0"/>
               <a:cs typeface="Helvetica" panose="020B0604020202020204" pitchFamily="34" charset="0"/>
             </a:endParaRPr>
@@ -4346,8 +4354,8 @@
         </p:nvCxnSpPr>
         <p:spPr>
           <a:xfrm flipH="1">
-            <a:off x="2882043" y="1895765"/>
-            <a:ext cx="3068" cy="290093"/>
+            <a:off x="2882043" y="1934835"/>
+            <a:ext cx="3068" cy="251023"/>
           </a:xfrm>
           <a:prstGeom prst="straightConnector1">
             <a:avLst/>
@@ -4384,8 +4392,8 @@
         </p:nvCxnSpPr>
         <p:spPr>
           <a:xfrm flipV="1">
-            <a:off x="4558562" y="1760613"/>
-            <a:ext cx="0" cy="435852"/>
+            <a:off x="4558562" y="1869436"/>
+            <a:ext cx="0" cy="327030"/>
           </a:xfrm>
           <a:prstGeom prst="straightConnector1">
             <a:avLst/>
@@ -4421,7 +4429,7 @@
         <p:spPr>
           <a:xfrm>
             <a:off x="2858535" y="1284638"/>
-            <a:ext cx="543739" cy="230832"/>
+            <a:ext cx="604653" cy="253916"/>
           </a:xfrm>
           <a:prstGeom prst="rect">
             <a:avLst/>
@@ -4435,13 +4443,13 @@
           <a:lstStyle/>
           <a:p>
             <a:r>
-              <a:rPr lang="en-US" sz="900" dirty="0" smtClean="0">
+              <a:rPr lang="en-US" sz="1050" dirty="0" smtClean="0">
                 <a:latin typeface="Helvetica" panose="020B0604020202020204" pitchFamily="34" charset="0"/>
                 <a:cs typeface="Helvetica" panose="020B0604020202020204" pitchFamily="34" charset="0"/>
               </a:rPr>
               <a:t>Python</a:t>
             </a:r>
-            <a:endParaRPr lang="en-US" sz="900" dirty="0">
+            <a:endParaRPr lang="en-US" sz="1050" dirty="0">
               <a:latin typeface="Helvetica" panose="020B0604020202020204" pitchFamily="34" charset="0"/>
               <a:cs typeface="Helvetica" panose="020B0604020202020204" pitchFamily="34" charset="0"/>
             </a:endParaRPr>
@@ -4493,7 +4501,7 @@
           <a:p>
             <a:pPr algn="ctr"/>
             <a:r>
-              <a:rPr lang="en-US" sz="1100" dirty="0" smtClean="0">
+              <a:rPr lang="en-US" sz="1200" dirty="0" smtClean="0">
                 <a:solidFill>
                   <a:schemeClr val="tx1"/>
                 </a:solidFill>
@@ -4502,7 +4510,7 @@
               </a:rPr>
               <a:t>LiDAR</a:t>
             </a:r>
-            <a:endParaRPr lang="en-US" sz="1100" dirty="0">
+            <a:endParaRPr lang="en-US" sz="1200" dirty="0">
               <a:solidFill>
                 <a:schemeClr val="tx1"/>
               </a:solidFill>
@@ -4521,7 +4529,7 @@
         <p:spPr>
           <a:xfrm>
             <a:off x="3831575" y="2765717"/>
-            <a:ext cx="1017622" cy="206508"/>
+            <a:ext cx="1098528" cy="206508"/>
           </a:xfrm>
           <a:prstGeom prst="roundRect">
             <a:avLst/>
@@ -4557,7 +4565,7 @@
           <a:p>
             <a:pPr algn="ctr"/>
             <a:r>
-              <a:rPr lang="en-US" sz="1100" dirty="0">
+              <a:rPr lang="en-US" sz="1200" dirty="0">
                 <a:solidFill>
                   <a:schemeClr val="tx1"/>
                 </a:solidFill>
@@ -4567,7 +4575,7 @@
               <a:t>i</a:t>
             </a:r>
             <a:r>
-              <a:rPr lang="en-US" sz="1100" dirty="0" smtClean="0">
+              <a:rPr lang="en-US" sz="1200" dirty="0" smtClean="0">
                 <a:solidFill>
                   <a:schemeClr val="tx1"/>
                 </a:solidFill>
@@ -4576,7 +4584,7 @@
               </a:rPr>
               <a:t>nventory</a:t>
             </a:r>
-            <a:endParaRPr lang="en-US" sz="1100" dirty="0">
+            <a:endParaRPr lang="en-US" sz="1200" dirty="0">
               <a:solidFill>
                 <a:schemeClr val="tx1"/>
               </a:solidFill>
@@ -4631,7 +4639,7 @@
           <a:p>
             <a:pPr algn="ctr"/>
             <a:r>
-              <a:rPr lang="en-US" sz="1100" dirty="0">
+              <a:rPr lang="en-US" sz="1200" dirty="0">
                 <a:solidFill>
                   <a:schemeClr val="tx1"/>
                 </a:solidFill>
@@ -4641,7 +4649,7 @@
               <a:t>r</a:t>
             </a:r>
             <a:r>
-              <a:rPr lang="en-US" sz="1100" dirty="0" smtClean="0">
+              <a:rPr lang="en-US" sz="1200" dirty="0" smtClean="0">
                 <a:solidFill>
                   <a:schemeClr val="tx1"/>
                 </a:solidFill>
@@ -4651,7 +4659,7 @@
               <a:t>egional </a:t>
             </a:r>
             <a:r>
-              <a:rPr lang="en-US" sz="1100" dirty="0">
+              <a:rPr lang="en-US" sz="1200" dirty="0">
                 <a:solidFill>
                   <a:schemeClr val="tx1"/>
                 </a:solidFill>
@@ -4661,7 +4669,7 @@
               <a:t>b</a:t>
             </a:r>
             <a:r>
-              <a:rPr lang="en-US" sz="1100" dirty="0" smtClean="0">
+              <a:rPr lang="en-US" sz="1200" dirty="0" smtClean="0">
                 <a:solidFill>
                   <a:schemeClr val="tx1"/>
                 </a:solidFill>
@@ -4670,7 +4678,7 @@
               </a:rPr>
               <a:t>oundaries </a:t>
             </a:r>
-            <a:endParaRPr lang="en-US" sz="1100" dirty="0">
+            <a:endParaRPr lang="en-US" sz="1200" dirty="0">
               <a:solidFill>
                 <a:schemeClr val="tx1"/>
               </a:solidFill>
@@ -4689,7 +4697,7 @@
         <p:spPr>
           <a:xfrm>
             <a:off x="2308569" y="1551650"/>
-            <a:ext cx="1153084" cy="344115"/>
+            <a:ext cx="1153084" cy="383185"/>
           </a:xfrm>
           <a:prstGeom prst="roundRect">
             <a:avLst/>
@@ -4725,7 +4733,7 @@
           <a:p>
             <a:pPr algn="ctr"/>
             <a:r>
-              <a:rPr lang="en-US" sz="1100" dirty="0" smtClean="0">
+              <a:rPr lang="en-US" sz="1200" dirty="0" smtClean="0">
                 <a:solidFill>
                   <a:schemeClr val="tx1"/>
                 </a:solidFill>
@@ -4734,7 +4742,7 @@
               </a:rPr>
               <a:t>filtering, formatting</a:t>
             </a:r>
-            <a:endParaRPr lang="en-US" sz="1100" dirty="0">
+            <a:endParaRPr lang="en-US" sz="1200" dirty="0">
               <a:solidFill>
                 <a:schemeClr val="tx1"/>
               </a:solidFill>
@@ -4792,7 +4800,7 @@
         <p:spPr>
           <a:xfrm>
             <a:off x="2867041" y="1935356"/>
-            <a:ext cx="870751" cy="230832"/>
+            <a:ext cx="984565" cy="253916"/>
           </a:xfrm>
           <a:prstGeom prst="rect">
             <a:avLst/>
@@ -4806,13 +4814,13 @@
           <a:lstStyle/>
           <a:p>
             <a:r>
-              <a:rPr lang="en-US" sz="900" dirty="0" smtClean="0">
+              <a:rPr lang="en-US" sz="1050" dirty="0" smtClean="0">
                 <a:latin typeface="Helvetica" panose="020B0604020202020204" pitchFamily="34" charset="0"/>
                 <a:cs typeface="Helvetica" panose="020B0604020202020204" pitchFamily="34" charset="0"/>
               </a:rPr>
               <a:t>SQL / Python</a:t>
             </a:r>
-            <a:endParaRPr lang="en-US" sz="900" dirty="0">
+            <a:endParaRPr lang="en-US" sz="1050" dirty="0">
               <a:latin typeface="Helvetica" panose="020B0604020202020204" pitchFamily="34" charset="0"/>
               <a:cs typeface="Helvetica" panose="020B0604020202020204" pitchFamily="34" charset="0"/>
             </a:endParaRPr>
@@ -4828,7 +4836,7 @@
         <p:spPr>
           <a:xfrm>
             <a:off x="3831575" y="3084743"/>
-            <a:ext cx="1017622" cy="373115"/>
+            <a:ext cx="1098528" cy="373115"/>
           </a:xfrm>
           <a:prstGeom prst="roundRect">
             <a:avLst/>
@@ -4864,7 +4872,7 @@
           <a:p>
             <a:pPr algn="ctr"/>
             <a:r>
-              <a:rPr lang="en-US" sz="1100" dirty="0" smtClean="0">
+              <a:rPr lang="en-US" sz="1200" dirty="0" smtClean="0">
                 <a:solidFill>
                   <a:schemeClr val="tx1"/>
                 </a:solidFill>
@@ -4873,7 +4881,7 @@
               </a:rPr>
               <a:t>extrapolated results</a:t>
             </a:r>
-            <a:endParaRPr lang="en-US" sz="1100" dirty="0">
+            <a:endParaRPr lang="en-US" sz="1200" dirty="0">
               <a:solidFill>
                 <a:schemeClr val="tx1"/>
               </a:solidFill>
@@ -4928,7 +4936,7 @@
         <p:spPr>
           <a:xfrm>
             <a:off x="2432253" y="3669492"/>
-            <a:ext cx="870751" cy="230832"/>
+            <a:ext cx="984565" cy="253916"/>
           </a:xfrm>
           <a:prstGeom prst="rect">
             <a:avLst/>
@@ -4942,13 +4950,13 @@
           <a:lstStyle/>
           <a:p>
             <a:r>
-              <a:rPr lang="en-US" sz="900" dirty="0" smtClean="0">
+              <a:rPr lang="en-US" sz="1050" dirty="0" smtClean="0">
                 <a:latin typeface="Helvetica" panose="020B0604020202020204" pitchFamily="34" charset="0"/>
                 <a:cs typeface="Helvetica" panose="020B0604020202020204" pitchFamily="34" charset="0"/>
               </a:rPr>
               <a:t>SQL / Python</a:t>
             </a:r>
-            <a:endParaRPr lang="en-US" sz="900" dirty="0">
+            <a:endParaRPr lang="en-US" sz="1050" dirty="0">
               <a:latin typeface="Helvetica" panose="020B0604020202020204" pitchFamily="34" charset="0"/>
               <a:cs typeface="Helvetica" panose="020B0604020202020204" pitchFamily="34" charset="0"/>
             </a:endParaRPr>
@@ -4964,7 +4972,7 @@
         <p:spPr>
           <a:xfrm>
             <a:off x="4494665" y="3658357"/>
-            <a:ext cx="870751" cy="230832"/>
+            <a:ext cx="984565" cy="253916"/>
           </a:xfrm>
           <a:prstGeom prst="rect">
             <a:avLst/>
@@ -4978,13 +4986,13 @@
           <a:lstStyle/>
           <a:p>
             <a:r>
-              <a:rPr lang="en-US" sz="900" dirty="0" smtClean="0">
+              <a:rPr lang="en-US" sz="1050" dirty="0" smtClean="0">
                 <a:latin typeface="Helvetica" panose="020B0604020202020204" pitchFamily="34" charset="0"/>
                 <a:cs typeface="Helvetica" panose="020B0604020202020204" pitchFamily="34" charset="0"/>
               </a:rPr>
               <a:t>SQL / Python</a:t>
             </a:r>
-            <a:endParaRPr lang="en-US" sz="900" dirty="0">
+            <a:endParaRPr lang="en-US" sz="1050" dirty="0">
               <a:latin typeface="Helvetica" panose="020B0604020202020204" pitchFamily="34" charset="0"/>
               <a:cs typeface="Helvetica" panose="020B0604020202020204" pitchFamily="34" charset="0"/>
             </a:endParaRPr>
@@ -5038,8 +5046,8 @@
         </p:nvCxnSpPr>
         <p:spPr>
           <a:xfrm flipV="1">
-            <a:off x="1894189" y="2913183"/>
-            <a:ext cx="344986" cy="569239"/>
+            <a:off x="1870185" y="2913183"/>
+            <a:ext cx="368990" cy="676990"/>
           </a:xfrm>
           <a:prstGeom prst="curvedConnector3">
             <a:avLst>
@@ -5077,7 +5085,7 @@
         <p:spPr>
           <a:xfrm>
             <a:off x="4532595" y="1951666"/>
-            <a:ext cx="870751" cy="230832"/>
+            <a:ext cx="984565" cy="253916"/>
           </a:xfrm>
           <a:prstGeom prst="rect">
             <a:avLst/>
@@ -5091,13 +5099,13 @@
           <a:lstStyle/>
           <a:p>
             <a:r>
-              <a:rPr lang="en-US" sz="900" dirty="0" smtClean="0">
+              <a:rPr lang="en-US" sz="1050" dirty="0" smtClean="0">
                 <a:latin typeface="Helvetica" panose="020B0604020202020204" pitchFamily="34" charset="0"/>
                 <a:cs typeface="Helvetica" panose="020B0604020202020204" pitchFamily="34" charset="0"/>
               </a:rPr>
               <a:t>SQL / Python</a:t>
             </a:r>
-            <a:endParaRPr lang="en-US" sz="900" dirty="0">
+            <a:endParaRPr lang="en-US" sz="1050" dirty="0">
               <a:latin typeface="Helvetica" panose="020B0604020202020204" pitchFamily="34" charset="0"/>
               <a:cs typeface="Helvetica" panose="020B0604020202020204" pitchFamily="34" charset="0"/>
             </a:endParaRPr>
@@ -5112,7 +5120,7 @@
         </p:nvSpPr>
         <p:spPr>
           <a:xfrm>
-            <a:off x="6143751" y="503096"/>
+            <a:off x="6299715" y="503095"/>
             <a:ext cx="1295084" cy="774177"/>
           </a:xfrm>
           <a:prstGeom prst="roundRect">
@@ -5149,7 +5157,7 @@
           <a:p>
             <a:pPr algn="ctr"/>
             <a:r>
-              <a:rPr lang="en-US" sz="1100" dirty="0" smtClean="0">
+              <a:rPr lang="en-US" sz="1200" dirty="0" smtClean="0">
                 <a:solidFill>
                   <a:schemeClr val="tx1"/>
                 </a:solidFill>
@@ -5158,7 +5166,7 @@
               </a:rPr>
               <a:t>statistical testing, spatial and temporal trend analysis</a:t>
             </a:r>
-            <a:endParaRPr lang="en-US" sz="1100" dirty="0">
+            <a:endParaRPr lang="en-US" sz="1200" dirty="0">
               <a:solidFill>
                 <a:schemeClr val="tx1"/>
               </a:solidFill>
@@ -5178,8 +5186,8 @@
         </p:nvCxnSpPr>
         <p:spPr>
           <a:xfrm flipV="1">
-            <a:off x="5729473" y="890185"/>
-            <a:ext cx="414278" cy="219368"/>
+            <a:off x="5729594" y="890184"/>
+            <a:ext cx="570121" cy="206548"/>
           </a:xfrm>
           <a:prstGeom prst="straightConnector1">
             <a:avLst/>
@@ -5214,8 +5222,8 @@
         </p:nvSpPr>
         <p:spPr>
           <a:xfrm>
-            <a:off x="6092236" y="1333483"/>
-            <a:ext cx="1419196" cy="507831"/>
+            <a:off x="6250710" y="1331925"/>
+            <a:ext cx="1560713" cy="577081"/>
           </a:xfrm>
           <a:prstGeom prst="rect">
             <a:avLst/>
@@ -5230,13 +5238,13 @@
           <a:p>
             <a:pPr algn="ctr"/>
             <a:r>
-              <a:rPr lang="en-US" sz="900" dirty="0" smtClean="0">
+              <a:rPr lang="en-US" sz="1050" dirty="0" smtClean="0">
                 <a:latin typeface="Helvetica" panose="020B0604020202020204" pitchFamily="34" charset="0"/>
                 <a:cs typeface="Helvetica" panose="020B0604020202020204" pitchFamily="34" charset="0"/>
               </a:rPr>
               <a:t>SQL / QGIS (cloud connection accessible to collaborators) </a:t>
             </a:r>
-            <a:endParaRPr lang="en-US" sz="900" dirty="0">
+            <a:endParaRPr lang="en-US" sz="1050" dirty="0">
               <a:latin typeface="Helvetica" panose="020B0604020202020204" pitchFamily="34" charset="0"/>
               <a:cs typeface="Helvetica" panose="020B0604020202020204" pitchFamily="34" charset="0"/>
             </a:endParaRPr>
@@ -5253,8 +5261,8 @@
         </p:nvCxnSpPr>
         <p:spPr>
           <a:xfrm flipV="1">
-            <a:off x="5729594" y="1268547"/>
-            <a:ext cx="463989" cy="1142367"/>
+            <a:off x="5729594" y="1257849"/>
+            <a:ext cx="604731" cy="1153065"/>
           </a:xfrm>
           <a:prstGeom prst="straightConnector1">
             <a:avLst/>
@@ -5289,8 +5297,8 @@
         </p:nvSpPr>
         <p:spPr>
           <a:xfrm>
-            <a:off x="5674729" y="659352"/>
-            <a:ext cx="543739" cy="230832"/>
+            <a:off x="5726933" y="669128"/>
+            <a:ext cx="604653" cy="253916"/>
           </a:xfrm>
           <a:prstGeom prst="rect">
             <a:avLst/>
@@ -5304,13 +5312,13 @@
           <a:lstStyle/>
           <a:p>
             <a:r>
-              <a:rPr lang="en-US" sz="900" dirty="0" smtClean="0">
+              <a:rPr lang="en-US" sz="1050" dirty="0" smtClean="0">
                 <a:latin typeface="Helvetica" panose="020B0604020202020204" pitchFamily="34" charset="0"/>
                 <a:cs typeface="Helvetica" panose="020B0604020202020204" pitchFamily="34" charset="0"/>
               </a:rPr>
               <a:t>Python</a:t>
             </a:r>
-            <a:endParaRPr lang="en-US" sz="900" dirty="0">
+            <a:endParaRPr lang="en-US" sz="1050" dirty="0">
               <a:latin typeface="Helvetica" panose="020B0604020202020204" pitchFamily="34" charset="0"/>
               <a:cs typeface="Helvetica" panose="020B0604020202020204" pitchFamily="34" charset="0"/>
             </a:endParaRPr>
@@ -5362,7 +5370,7 @@
         </p:nvSpPr>
         <p:spPr>
           <a:xfrm>
-            <a:off x="6143751" y="2165243"/>
+            <a:off x="6299715" y="2165242"/>
             <a:ext cx="1295084" cy="619454"/>
           </a:xfrm>
           <a:prstGeom prst="roundRect">
@@ -5399,7 +5407,7 @@
           <a:p>
             <a:pPr algn="ctr"/>
             <a:r>
-              <a:rPr lang="en-US" sz="1100" dirty="0" smtClean="0">
+              <a:rPr lang="en-US" sz="1200" dirty="0" smtClean="0">
                 <a:solidFill>
                   <a:schemeClr val="tx1"/>
                 </a:solidFill>
@@ -5408,7 +5416,7 @@
               </a:rPr>
               <a:t>plots, tables, manuscript preparation</a:t>
             </a:r>
-            <a:endParaRPr lang="en-US" sz="1100" dirty="0">
+            <a:endParaRPr lang="en-US" sz="1200" dirty="0">
               <a:solidFill>
                 <a:schemeClr val="tx1"/>
               </a:solidFill>
@@ -5426,7 +5434,7 @@
         </p:nvCxnSpPr>
         <p:spPr>
           <a:xfrm>
-            <a:off x="6731453" y="1881868"/>
+            <a:off x="6975836" y="1872989"/>
             <a:ext cx="4681" cy="283375"/>
           </a:xfrm>
           <a:prstGeom prst="straightConnector1">
@@ -5462,8 +5470,8 @@
         </p:nvSpPr>
         <p:spPr>
           <a:xfrm>
-            <a:off x="6172961" y="2802452"/>
-            <a:ext cx="1145256" cy="369332"/>
+            <a:off x="6349431" y="2857891"/>
+            <a:ext cx="1245368" cy="415498"/>
           </a:xfrm>
           <a:prstGeom prst="rect">
             <a:avLst/>
@@ -5478,20 +5486,20 @@
           <a:p>
             <a:pPr algn="ctr"/>
             <a:r>
-              <a:rPr lang="en-US" sz="900" dirty="0" err="1" smtClean="0">
+              <a:rPr lang="en-US" sz="1050" dirty="0" err="1" smtClean="0">
                 <a:latin typeface="Helvetica" panose="020B0604020202020204" pitchFamily="34" charset="0"/>
                 <a:cs typeface="Helvetica" panose="020B0604020202020204" pitchFamily="34" charset="0"/>
               </a:rPr>
               <a:t>Jupyter</a:t>
             </a:r>
             <a:r>
-              <a:rPr lang="en-US" sz="900" dirty="0" smtClean="0">
+              <a:rPr lang="en-US" sz="1050" dirty="0" smtClean="0">
                 <a:latin typeface="Helvetica" panose="020B0604020202020204" pitchFamily="34" charset="0"/>
                 <a:cs typeface="Helvetica" panose="020B0604020202020204" pitchFamily="34" charset="0"/>
               </a:rPr>
               <a:t> notebook  MS Word</a:t>
             </a:r>
-            <a:endParaRPr lang="en-US" sz="900" dirty="0">
+            <a:endParaRPr lang="en-US" sz="1050" dirty="0">
               <a:latin typeface="Helvetica" panose="020B0604020202020204" pitchFamily="34" charset="0"/>
               <a:cs typeface="Helvetica" panose="020B0604020202020204" pitchFamily="34" charset="0"/>
             </a:endParaRPr>
@@ -5506,7 +5514,7 @@
         </p:nvSpPr>
         <p:spPr>
           <a:xfrm>
-            <a:off x="6172961" y="3346585"/>
+            <a:off x="6328925" y="3346584"/>
             <a:ext cx="1265874" cy="542604"/>
           </a:xfrm>
           <a:prstGeom prst="roundRect">
@@ -5543,7 +5551,7 @@
           <a:p>
             <a:pPr algn="ctr"/>
             <a:r>
-              <a:rPr lang="en-US" sz="1100" dirty="0" smtClean="0">
+              <a:rPr lang="en-US" sz="1200" dirty="0" smtClean="0">
                 <a:solidFill>
                   <a:schemeClr val="tx1"/>
                 </a:solidFill>
@@ -5552,7 +5560,7 @@
               </a:rPr>
               <a:t>version control and distribution</a:t>
             </a:r>
-            <a:endParaRPr lang="en-US" sz="1100" dirty="0">
+            <a:endParaRPr lang="en-US" sz="1200" dirty="0">
               <a:solidFill>
                 <a:schemeClr val="tx1"/>
               </a:solidFill>
@@ -5571,9 +5579,9 @@
           <p:nvPr/>
         </p:nvCxnSpPr>
         <p:spPr>
-          <a:xfrm>
-            <a:off x="5731329" y="2473779"/>
-            <a:ext cx="412422" cy="1191"/>
+          <a:xfrm flipV="1">
+            <a:off x="5716600" y="2474969"/>
+            <a:ext cx="583115" cy="11579"/>
           </a:xfrm>
           <a:prstGeom prst="straightConnector1">
             <a:avLst/>
@@ -5608,8 +5616,8 @@
         </p:nvSpPr>
         <p:spPr>
           <a:xfrm>
-            <a:off x="6369903" y="3929301"/>
-            <a:ext cx="770631" cy="230832"/>
+            <a:off x="6534046" y="3929301"/>
+            <a:ext cx="868442" cy="253916"/>
           </a:xfrm>
           <a:prstGeom prst="rect">
             <a:avLst/>
@@ -5623,34 +5631,27 @@
           <a:lstStyle/>
           <a:p>
             <a:r>
-              <a:rPr lang="en-US" sz="900" dirty="0" err="1" smtClean="0">
+              <a:rPr lang="en-US" sz="1050" dirty="0" err="1" smtClean="0">
                 <a:latin typeface="Helvetica" panose="020B0604020202020204" pitchFamily="34" charset="0"/>
                 <a:cs typeface="Helvetica" panose="020B0604020202020204" pitchFamily="34" charset="0"/>
               </a:rPr>
               <a:t>git</a:t>
             </a:r>
             <a:r>
-              <a:rPr lang="en-US" sz="900" dirty="0" smtClean="0">
+              <a:rPr lang="en-US" sz="1050" dirty="0" smtClean="0">
                 <a:latin typeface="Helvetica" panose="020B0604020202020204" pitchFamily="34" charset="0"/>
                 <a:cs typeface="Helvetica" panose="020B0604020202020204" pitchFamily="34" charset="0"/>
               </a:rPr>
               <a:t> / </a:t>
             </a:r>
             <a:r>
-              <a:rPr lang="en-US" sz="900" dirty="0" err="1" smtClean="0">
+              <a:rPr lang="en-US" sz="1050" dirty="0" err="1" smtClean="0">
                 <a:latin typeface="Helvetica" panose="020B0604020202020204" pitchFamily="34" charset="0"/>
                 <a:cs typeface="Helvetica" panose="020B0604020202020204" pitchFamily="34" charset="0"/>
               </a:rPr>
-              <a:t>G</a:t>
-            </a:r>
-            <a:r>
-              <a:rPr lang="en-US" sz="900" dirty="0" err="1" smtClean="0">
-                <a:latin typeface="Helvetica" panose="020B0604020202020204" pitchFamily="34" charset="0"/>
-                <a:cs typeface="Helvetica" panose="020B0604020202020204" pitchFamily="34" charset="0"/>
-              </a:rPr>
-              <a:t>itHub</a:t>
-            </a:r>
-            <a:endParaRPr lang="en-US" sz="900" dirty="0">
+              <a:t>GitHub</a:t>
+            </a:r>
+            <a:endParaRPr lang="en-US" sz="1050" dirty="0">
               <a:latin typeface="Helvetica" panose="020B0604020202020204" pitchFamily="34" charset="0"/>
               <a:cs typeface="Helvetica" panose="020B0604020202020204" pitchFamily="34" charset="0"/>
             </a:endParaRPr>
@@ -5665,8 +5666,8 @@
         </p:nvSpPr>
         <p:spPr>
           <a:xfrm rot="10115334">
-            <a:off x="5769164" y="3085611"/>
-            <a:ext cx="619869" cy="593289"/>
+            <a:off x="5773938" y="3063291"/>
+            <a:ext cx="838487" cy="663400"/>
           </a:xfrm>
           <a:prstGeom prst="arc">
             <a:avLst/>
@@ -5710,8 +5711,8 @@
         </p:nvSpPr>
         <p:spPr>
           <a:xfrm rot="20252602">
-            <a:off x="5590035" y="3143806"/>
-            <a:ext cx="619869" cy="593289"/>
+            <a:off x="5609321" y="3119939"/>
+            <a:ext cx="720810" cy="714306"/>
           </a:xfrm>
           <a:prstGeom prst="arc">
             <a:avLst/>
@@ -5758,12 +5759,12 @@
         </p:nvCxnSpPr>
         <p:spPr>
           <a:xfrm flipH="1">
-            <a:off x="5375399" y="1268026"/>
-            <a:ext cx="32507" cy="2868325"/>
+            <a:off x="5375399" y="1266607"/>
+            <a:ext cx="32507" cy="2869744"/>
           </a:xfrm>
           <a:prstGeom prst="bentConnector3">
             <a:avLst>
-              <a:gd name="adj1" fmla="val -502307"/>
+              <a:gd name="adj1" fmla="val -703233"/>
             </a:avLst>
           </a:prstGeom>
           <a:ln>

</xml_diff>